<commit_message>
Ppt changes + Css Angular
</commit_message>
<xml_diff>
--- a/Angular/Presentation/AngularPresentation.pptx
+++ b/Angular/Presentation/AngularPresentation.pptx
@@ -320,7 +320,7 @@
           <a:p>
             <a:fld id="{1D8BD707-D9CF-40AE-B4C6-C98DA3205C09}" type="datetimeFigureOut">
               <a:rPr lang="en-US"/>
-              <a:t>5/16/2019</a:t>
+              <a:t>5/20/2019</a:t>
             </a:fld>
             <a:endParaRPr lang="en-US"/>
           </a:p>
@@ -521,7 +521,7 @@
           <a:p>
             <a:fld id="{1D8BD707-D9CF-40AE-B4C6-C98DA3205C09}" type="datetimeFigureOut">
               <a:rPr lang="en-US"/>
-              <a:t>5/16/2019</a:t>
+              <a:t>5/20/2019</a:t>
             </a:fld>
             <a:endParaRPr lang="en-US"/>
           </a:p>
@@ -759,7 +759,7 @@
           <a:p>
             <a:fld id="{1D8BD707-D9CF-40AE-B4C6-C98DA3205C09}" type="datetimeFigureOut">
               <a:rPr lang="en-US"/>
-              <a:t>5/16/2019</a:t>
+              <a:t>5/20/2019</a:t>
             </a:fld>
             <a:endParaRPr lang="en-US"/>
           </a:p>
@@ -931,7 +931,7 @@
           <a:p>
             <a:fld id="{1D8BD707-D9CF-40AE-B4C6-C98DA3205C09}" type="datetimeFigureOut">
               <a:rPr lang="en-US"/>
-              <a:t>5/16/2019</a:t>
+              <a:t>5/20/2019</a:t>
             </a:fld>
             <a:endParaRPr lang="en-US"/>
           </a:p>
@@ -1074,7 +1074,7 @@
           <a:p>
             <a:fld id="{1D8BD707-D9CF-40AE-B4C6-C98DA3205C09}" type="datetimeFigureOut">
               <a:rPr lang="en-US"/>
-              <a:t>5/16/2019</a:t>
+              <a:t>5/20/2019</a:t>
             </a:fld>
             <a:endParaRPr lang="en-US"/>
           </a:p>
@@ -1423,7 +1423,7 @@
           <a:p>
             <a:fld id="{1D8BD707-D9CF-40AE-B4C6-C98DA3205C09}" type="datetimeFigureOut">
               <a:rPr lang="en-US"/>
-              <a:t>5/16/2019</a:t>
+              <a:t>5/20/2019</a:t>
             </a:fld>
             <a:endParaRPr lang="en-US"/>
           </a:p>
@@ -1858,12 +1858,12 @@
               <a:t> </a:t>
             </a:r>
             <a:r>
-              <a:rPr sz="12500" u="none" dirty="0">
+              <a:rPr lang="en-US" sz="12500" u="none" spc="-350" dirty="0">
                 <a:solidFill>
                   <a:srgbClr val="252525"/>
                 </a:solidFill>
               </a:rPr>
-              <a:t>2</a:t>
+              <a:t>6</a:t>
             </a:r>
             <a:endParaRPr sz="12500" dirty="0"/>
           </a:p>
@@ -6819,8 +6819,12 @@
               <a:t> </a:t>
             </a:r>
             <a:r>
+              <a:rPr lang="en-US" spc="-200" dirty="0"/>
+              <a:t>6</a:t>
+            </a:r>
+            <a:r>
               <a:rPr dirty="0"/>
-              <a:t>2	</a:t>
+              <a:t>	</a:t>
             </a:r>
           </a:p>
         </p:txBody>
@@ -10840,8 +10844,12 @@
               <a:t> </a:t>
             </a:r>
             <a:r>
+              <a:rPr lang="en-US" spc="-25" dirty="0"/>
+              <a:t>6</a:t>
+            </a:r>
+            <a:r>
               <a:rPr spc="-25" dirty="0"/>
-              <a:t>2?	</a:t>
+              <a:t>?	</a:t>
             </a:r>
           </a:p>
         </p:txBody>

</xml_diff>